<commit_message>
Update RegularMenu assets with new images and presentation
</commit_message>
<xml_diff>
--- a/Assets/Menu/RegularMenu/Menu.pptx
+++ b/Assets/Menu/RegularMenu/Menu.pptx
@@ -10632,8 +10632,8 @@
         </p:nvSpPr>
         <p:spPr>
           <a:xfrm>
-            <a:off x="246660" y="361058"/>
-            <a:ext cx="5595904" cy="3934717"/>
+            <a:off x="246660" y="361059"/>
+            <a:ext cx="5595904" cy="3530740"/>
           </a:xfrm>
           <a:prstGeom prst="roundRect">
             <a:avLst>
@@ -10695,8 +10695,8 @@
         </p:nvSpPr>
         <p:spPr>
           <a:xfrm>
-            <a:off x="12223377" y="361057"/>
-            <a:ext cx="5639849" cy="2647701"/>
+            <a:off x="12223377" y="361058"/>
+            <a:ext cx="5639849" cy="2354446"/>
           </a:xfrm>
           <a:prstGeom prst="roundRect">
             <a:avLst>
@@ -10747,7 +10747,7 @@
         </p:nvSpPr>
         <p:spPr>
           <a:xfrm>
-            <a:off x="12225406" y="3379945"/>
+            <a:off x="12231922" y="3227350"/>
             <a:ext cx="5680800" cy="3106579"/>
           </a:xfrm>
           <a:prstGeom prst="roundRect">
@@ -10810,7 +10810,7 @@
         </p:nvSpPr>
         <p:spPr>
           <a:xfrm>
-            <a:off x="202714" y="4525206"/>
+            <a:off x="202714" y="4277556"/>
             <a:ext cx="5639850" cy="2932039"/>
           </a:xfrm>
           <a:prstGeom prst="roundRect">
@@ -11065,7 +11065,7 @@
         </p:nvSpPr>
         <p:spPr>
           <a:xfrm>
-            <a:off x="187998" y="5225907"/>
+            <a:off x="187998" y="4978257"/>
             <a:ext cx="4048572" cy="1938948"/>
           </a:xfrm>
           <a:prstGeom prst="rect">
@@ -11136,7 +11136,7 @@
         <p:spPr>
           <a:xfrm>
             <a:off x="332154" y="1378623"/>
-            <a:ext cx="4038729" cy="2769945"/>
+            <a:ext cx="4038729" cy="2354446"/>
           </a:xfrm>
           <a:prstGeom prst="rect">
             <a:avLst/>
@@ -11159,18 +11159,7 @@
                 <a:cs typeface="Calibri"/>
                 <a:sym typeface="Calibri"/>
               </a:rPr>
-              <a:t>Nachos w/ Chili &amp; Cheese</a:t>
-            </a:r>
-          </a:p>
-          <a:p>
-            <a:r>
-              <a:rPr lang="en-US" sz="2700" b="1" dirty="0">
-                <a:latin typeface="Calibri"/>
-                <a:ea typeface="Calibri"/>
-                <a:cs typeface="Calibri"/>
-                <a:sym typeface="Calibri"/>
-              </a:rPr>
-              <a:t>Nachos w/ Cheese</a:t>
+              <a:t>Nachos</a:t>
             </a:r>
           </a:p>
           <a:p>
@@ -11228,7 +11217,7 @@
         <p:spPr>
           <a:xfrm>
             <a:off x="12262283" y="1064589"/>
-            <a:ext cx="2098588" cy="1938948"/>
+            <a:ext cx="2098588" cy="1523450"/>
           </a:xfrm>
           <a:prstGeom prst="rect">
             <a:avLst/>
@@ -11272,17 +11261,6 @@
                 <a:sym typeface="Calibri"/>
               </a:rPr>
               <a:t>Ice Cream</a:t>
-            </a:r>
-          </a:p>
-          <a:p>
-            <a:r>
-              <a:rPr lang="en-US" sz="2700" b="1" dirty="0">
-                <a:latin typeface="Calibri"/>
-                <a:ea typeface="Calibri"/>
-                <a:cs typeface="Calibri"/>
-                <a:sym typeface="Calibri"/>
-              </a:rPr>
-              <a:t>Icee</a:t>
             </a:r>
           </a:p>
           <a:p>
@@ -11384,7 +11362,7 @@
         </p:nvSpPr>
         <p:spPr>
           <a:xfrm>
-            <a:off x="12216861" y="4034235"/>
+            <a:off x="12223377" y="3881640"/>
             <a:ext cx="2794273" cy="2354446"/>
           </a:xfrm>
           <a:prstGeom prst="rect">
@@ -11577,7 +11555,7 @@
         </p:nvSpPr>
         <p:spPr>
           <a:xfrm>
-            <a:off x="4370884" y="5213679"/>
+            <a:off x="4370884" y="4966029"/>
             <a:ext cx="1303499" cy="1938948"/>
           </a:xfrm>
           <a:prstGeom prst="rect">
@@ -11658,7 +11636,7 @@
         <p:spPr>
           <a:xfrm>
             <a:off x="4370884" y="1378623"/>
-            <a:ext cx="1280708" cy="2769945"/>
+            <a:ext cx="1280708" cy="2354446"/>
           </a:xfrm>
           <a:prstGeom prst="rect">
             <a:avLst/>
@@ -11682,7 +11660,7 @@
                 <a:cs typeface="Calibri"/>
                 <a:sym typeface="Calibri"/>
               </a:rPr>
-              <a:t>$3.00</a:t>
+              <a:t>$2.50</a:t>
             </a:r>
           </a:p>
           <a:p>
@@ -11694,19 +11672,7 @@
                 <a:cs typeface="Calibri"/>
                 <a:sym typeface="Calibri"/>
               </a:rPr>
-              <a:t>$2.00</a:t>
-            </a:r>
-          </a:p>
-          <a:p>
-            <a:pPr algn="r"/>
-            <a:r>
-              <a:rPr lang="en-US" sz="2700" b="1" dirty="0">
-                <a:latin typeface="Calibri"/>
-                <a:ea typeface="Calibri"/>
-                <a:cs typeface="Calibri"/>
-                <a:sym typeface="Calibri"/>
-              </a:rPr>
-              <a:t>$2.00</a:t>
+              <a:t>$2.50</a:t>
             </a:r>
           </a:p>
           <a:p>
@@ -11762,7 +11728,7 @@
         <p:spPr>
           <a:xfrm>
             <a:off x="15463422" y="1064589"/>
-            <a:ext cx="2211659" cy="1938948"/>
+            <a:ext cx="2211659" cy="1523450"/>
           </a:xfrm>
           <a:prstGeom prst="rect">
             <a:avLst/>
@@ -11804,7 +11770,7 @@
                 <a:cs typeface="Calibri"/>
                 <a:sym typeface="Calibri"/>
               </a:rPr>
-              <a:t>$1.00 - $3.00</a:t>
+              <a:t>$3.00</a:t>
             </a:r>
             <a:endParaRPr sz="2700" b="1" dirty="0">
               <a:latin typeface="Calibri"/>
@@ -11812,18 +11778,6 @@
               <a:cs typeface="Calibri"/>
               <a:sym typeface="Calibri"/>
             </a:endParaRPr>
-          </a:p>
-          <a:p>
-            <a:pPr algn="r"/>
-            <a:r>
-              <a:rPr lang="en-US" sz="2700" b="1" dirty="0">
-                <a:latin typeface="Calibri"/>
-                <a:ea typeface="Calibri"/>
-                <a:cs typeface="Calibri"/>
-                <a:sym typeface="Calibri"/>
-              </a:rPr>
-              <a:t>$2.00</a:t>
-            </a:r>
           </a:p>
           <a:p>
             <a:pPr algn="r"/>
@@ -11859,7 +11813,7 @@
         </p:nvSpPr>
         <p:spPr>
           <a:xfrm>
-            <a:off x="16715018" y="4044393"/>
+            <a:off x="16721534" y="3891798"/>
             <a:ext cx="1122694" cy="2354446"/>
           </a:xfrm>
           <a:prstGeom prst="rect">

</xml_diff>

<commit_message>
Update RegularMenu assets with new images and presentation files
</commit_message>
<xml_diff>
--- a/Assets/Menu/RegularMenu/Menu.pptx
+++ b/Assets/Menu/RegularMenu/Menu.pptx
@@ -10810,8 +10810,8 @@
         </p:nvSpPr>
         <p:spPr>
           <a:xfrm>
-            <a:off x="202714" y="4277556"/>
-            <a:ext cx="5639850" cy="2932039"/>
+            <a:off x="202714" y="4553782"/>
+            <a:ext cx="5639850" cy="2360806"/>
           </a:xfrm>
           <a:prstGeom prst="roundRect">
             <a:avLst>
@@ -11065,8 +11065,8 @@
         </p:nvSpPr>
         <p:spPr>
           <a:xfrm>
-            <a:off x="187998" y="4978257"/>
-            <a:ext cx="4048572" cy="1938948"/>
+            <a:off x="187998" y="5254482"/>
+            <a:ext cx="4048572" cy="1523450"/>
           </a:xfrm>
           <a:prstGeom prst="rect">
             <a:avLst/>
@@ -11112,17 +11112,6 @@
                 <a:sym typeface="Calibri"/>
               </a:rPr>
               <a:t>+Chili</a:t>
-            </a:r>
-          </a:p>
-          <a:p>
-            <a:r>
-              <a:rPr lang="en-US" sz="2700" b="1" dirty="0">
-                <a:latin typeface="Calibri"/>
-                <a:ea typeface="Calibri"/>
-                <a:cs typeface="Calibri"/>
-                <a:sym typeface="Calibri"/>
-              </a:rPr>
-              <a:t>+Butter</a:t>
             </a:r>
           </a:p>
         </p:txBody>
@@ -11555,8 +11544,8 @@
         </p:nvSpPr>
         <p:spPr>
           <a:xfrm>
-            <a:off x="4370884" y="4966029"/>
-            <a:ext cx="1303499" cy="1938948"/>
+            <a:off x="4370884" y="5242254"/>
+            <a:ext cx="1303499" cy="1523450"/>
           </a:xfrm>
           <a:prstGeom prst="rect">
             <a:avLst/>
@@ -11571,18 +11560,6 @@
             <a:spAutoFit/>
           </a:bodyPr>
           <a:lstStyle/>
-          <a:p>
-            <a:pPr algn="r"/>
-            <a:r>
-              <a:rPr lang="en-US" sz="2700" b="1" dirty="0">
-                <a:latin typeface="Calibri"/>
-                <a:ea typeface="Calibri"/>
-                <a:cs typeface="Calibri"/>
-                <a:sym typeface="Calibri"/>
-              </a:rPr>
-              <a:t>$0.50</a:t>
-            </a:r>
-          </a:p>
           <a:p>
             <a:pPr algn="r"/>
             <a:r>

</xml_diff>